<commit_message>
Title pages 01, 02.
</commit_message>
<xml_diff>
--- a/final-presentations/2021-04-12-ecpam/01-overview.pptx
+++ b/final-presentations/2021-04-12-ecpam/01-overview.pptx
@@ -263,7 +263,7 @@
           <a:p>
             <a:fld id="{0B842F42-2CE9-4E35-95C1-410DC08A50B1}" type="datetimeFigureOut">
               <a:rPr lang="en-US" smtClean="0"/>
-              <a:t>4/6/2021</a:t>
+              <a:t>4/8/21</a:t>
             </a:fld>
             <a:endParaRPr lang="en-US"/>
           </a:p>
@@ -428,7 +428,7 @@
           <a:p>
             <a:fld id="{6F282904-F315-4730-8D91-37D99E141A6F}" type="datetimeFigureOut">
               <a:rPr lang="en-US" smtClean="0"/>
-              <a:t>4/6/2021</a:t>
+              <a:t>4/8/21</a:t>
             </a:fld>
             <a:endParaRPr lang="en-US"/>
           </a:p>
@@ -4213,7 +4213,12 @@
             <p:ph type="subTitle" idx="1"/>
           </p:nvPr>
         </p:nvSpPr>
-        <p:spPr/>
+        <p:spPr>
+          <a:xfrm>
+            <a:off x="3177632" y="2085961"/>
+            <a:ext cx="8292317" cy="3322617"/>
+          </a:xfrm>
+        </p:spPr>
         <p:txBody>
           <a:bodyPr/>
           <a:lstStyle/>
@@ -8676,12 +8681,9 @@
 </file>
 
 <file path=customXml/item1.xml><?xml version="1.0" encoding="utf-8"?>
-<?mso-contentType ?>
-<FormTemplates xmlns="http://schemas.microsoft.com/sharepoint/v3/contenttype/forms">
-  <Display>DocumentLibraryForm</Display>
-  <Edit>DocumentLibraryForm</Edit>
-  <New>DocumentLibraryForm</New>
-</FormTemplates>
+<p:properties xmlns:p="http://schemas.microsoft.com/office/2006/metadata/properties" xmlns:xsi="http://www.w3.org/2001/XMLSchema-instance" xmlns:pc="http://schemas.microsoft.com/office/infopath/2007/PartnerControls">
+  <documentManagement/>
+</p:properties>
 </file>
 
 <file path=customXml/item2.xml><?xml version="1.0" encoding="utf-8"?>
@@ -8734,15 +8736,25 @@
 </file>
 
 <file path=customXml/item3.xml><?xml version="1.0" encoding="utf-8"?>
-<p:properties xmlns:p="http://schemas.microsoft.com/office/2006/metadata/properties" xmlns:xsi="http://www.w3.org/2001/XMLSchema-instance" xmlns:pc="http://schemas.microsoft.com/office/infopath/2007/PartnerControls">
-  <documentManagement/>
-</p:properties>
+<?mso-contentType ?>
+<FormTemplates xmlns="http://schemas.microsoft.com/sharepoint/v3/contenttype/forms">
+  <Display>DocumentLibraryForm</Display>
+  <Edit>DocumentLibraryForm</Edit>
+  <New>DocumentLibraryForm</New>
+</FormTemplates>
 </file>
 
 <file path=customXml/itemProps1.xml><?xml version="1.0" encoding="utf-8"?>
-<ds:datastoreItem xmlns:ds="http://schemas.openxmlformats.org/officeDocument/2006/customXml" ds:itemID="{19E20559-B232-4371-8690-E3D8007EDB82}">
+<ds:datastoreItem xmlns:ds="http://schemas.openxmlformats.org/officeDocument/2006/customXml" ds:itemID="{A50EC660-24D0-43A0-AE5E-E274115E726B}">
   <ds:schemaRefs>
-    <ds:schemaRef ds:uri="http://schemas.microsoft.com/sharepoint/v3/contenttype/forms"/>
+    <ds:schemaRef ds:uri="http://www.w3.org/XML/1998/namespace"/>
+    <ds:schemaRef ds:uri="http://schemas.microsoft.com/office/2006/documentManagement/types"/>
+    <ds:schemaRef ds:uri="http://purl.org/dc/elements/1.1/"/>
+    <ds:schemaRef ds:uri="http://purl.org/dc/terms/"/>
+    <ds:schemaRef ds:uri="http://schemas.openxmlformats.org/package/2006/metadata/core-properties"/>
+    <ds:schemaRef ds:uri="http://schemas.microsoft.com/office/2006/metadata/properties"/>
+    <ds:schemaRef ds:uri="http://purl.org/dc/dcmitype/"/>
+    <ds:schemaRef ds:uri="http://schemas.microsoft.com/office/infopath/2007/PartnerControls"/>
   </ds:schemaRefs>
 </ds:datastoreItem>
 </file>
@@ -8763,16 +8775,9 @@
 </file>
 
 <file path=customXml/itemProps3.xml><?xml version="1.0" encoding="utf-8"?>
-<ds:datastoreItem xmlns:ds="http://schemas.openxmlformats.org/officeDocument/2006/customXml" ds:itemID="{A50EC660-24D0-43A0-AE5E-E274115E726B}">
+<ds:datastoreItem xmlns:ds="http://schemas.openxmlformats.org/officeDocument/2006/customXml" ds:itemID="{19E20559-B232-4371-8690-E3D8007EDB82}">
   <ds:schemaRefs>
-    <ds:schemaRef ds:uri="http://www.w3.org/XML/1998/namespace"/>
-    <ds:schemaRef ds:uri="http://schemas.microsoft.com/office/2006/documentManagement/types"/>
-    <ds:schemaRef ds:uri="http://purl.org/dc/elements/1.1/"/>
-    <ds:schemaRef ds:uri="http://purl.org/dc/terms/"/>
-    <ds:schemaRef ds:uri="http://schemas.openxmlformats.org/package/2006/metadata/core-properties"/>
-    <ds:schemaRef ds:uri="http://schemas.microsoft.com/office/2006/metadata/properties"/>
-    <ds:schemaRef ds:uri="http://purl.org/dc/dcmitype/"/>
-    <ds:schemaRef ds:uri="http://schemas.microsoft.com/office/infopath/2007/PartnerControls"/>
+    <ds:schemaRef ds:uri="http://schemas.microsoft.com/sharepoint/v3/contenttype/forms"/>
   </ds:schemaRefs>
 </ds:datastoreItem>
 </file>
</xml_diff>

<commit_message>
Revert "Merge branch 'master' of https://github.com/bssw-tutorial/presentations"
This reverts commit f12bade0e0006e63d234a7ee4d6bb2fe3956049a, reversing
changes made to 8a3cb3ad9cce130d0e3e5e4cb7c084f99c94fa8d.
</commit_message>
<xml_diff>
--- a/final-presentations/2021-04-12-ecpam/01-overview.pptx
+++ b/final-presentations/2021-04-12-ecpam/01-overview.pptx
@@ -263,7 +263,7 @@
           <a:p>
             <a:fld id="{0B842F42-2CE9-4E35-95C1-410DC08A50B1}" type="datetimeFigureOut">
               <a:rPr lang="en-US" smtClean="0"/>
-              <a:t>4/8/21</a:t>
+              <a:t>4/6/2021</a:t>
             </a:fld>
             <a:endParaRPr lang="en-US"/>
           </a:p>
@@ -428,7 +428,7 @@
           <a:p>
             <a:fld id="{6F282904-F315-4730-8D91-37D99E141A6F}" type="datetimeFigureOut">
               <a:rPr lang="en-US" smtClean="0"/>
-              <a:t>4/8/21</a:t>
+              <a:t>4/6/2021</a:t>
             </a:fld>
             <a:endParaRPr lang="en-US"/>
           </a:p>
@@ -4213,12 +4213,7 @@
             <p:ph type="subTitle" idx="1"/>
           </p:nvPr>
         </p:nvSpPr>
-        <p:spPr>
-          <a:xfrm>
-            <a:off x="3177632" y="2085961"/>
-            <a:ext cx="8292317" cy="3322617"/>
-          </a:xfrm>
-        </p:spPr>
+        <p:spPr/>
         <p:txBody>
           <a:bodyPr/>
           <a:lstStyle/>
@@ -8681,9 +8676,12 @@
 </file>
 
 <file path=customXml/item1.xml><?xml version="1.0" encoding="utf-8"?>
-<p:properties xmlns:p="http://schemas.microsoft.com/office/2006/metadata/properties" xmlns:xsi="http://www.w3.org/2001/XMLSchema-instance" xmlns:pc="http://schemas.microsoft.com/office/infopath/2007/PartnerControls">
-  <documentManagement/>
-</p:properties>
+<?mso-contentType ?>
+<FormTemplates xmlns="http://schemas.microsoft.com/sharepoint/v3/contenttype/forms">
+  <Display>DocumentLibraryForm</Display>
+  <Edit>DocumentLibraryForm</Edit>
+  <New>DocumentLibraryForm</New>
+</FormTemplates>
 </file>
 
 <file path=customXml/item2.xml><?xml version="1.0" encoding="utf-8"?>
@@ -8736,25 +8734,15 @@
 </file>
 
 <file path=customXml/item3.xml><?xml version="1.0" encoding="utf-8"?>
-<?mso-contentType ?>
-<FormTemplates xmlns="http://schemas.microsoft.com/sharepoint/v3/contenttype/forms">
-  <Display>DocumentLibraryForm</Display>
-  <Edit>DocumentLibraryForm</Edit>
-  <New>DocumentLibraryForm</New>
-</FormTemplates>
+<p:properties xmlns:p="http://schemas.microsoft.com/office/2006/metadata/properties" xmlns:xsi="http://www.w3.org/2001/XMLSchema-instance" xmlns:pc="http://schemas.microsoft.com/office/infopath/2007/PartnerControls">
+  <documentManagement/>
+</p:properties>
 </file>
 
 <file path=customXml/itemProps1.xml><?xml version="1.0" encoding="utf-8"?>
-<ds:datastoreItem xmlns:ds="http://schemas.openxmlformats.org/officeDocument/2006/customXml" ds:itemID="{A50EC660-24D0-43A0-AE5E-E274115E726B}">
+<ds:datastoreItem xmlns:ds="http://schemas.openxmlformats.org/officeDocument/2006/customXml" ds:itemID="{19E20559-B232-4371-8690-E3D8007EDB82}">
   <ds:schemaRefs>
-    <ds:schemaRef ds:uri="http://www.w3.org/XML/1998/namespace"/>
-    <ds:schemaRef ds:uri="http://schemas.microsoft.com/office/2006/documentManagement/types"/>
-    <ds:schemaRef ds:uri="http://purl.org/dc/elements/1.1/"/>
-    <ds:schemaRef ds:uri="http://purl.org/dc/terms/"/>
-    <ds:schemaRef ds:uri="http://schemas.openxmlformats.org/package/2006/metadata/core-properties"/>
-    <ds:schemaRef ds:uri="http://schemas.microsoft.com/office/2006/metadata/properties"/>
-    <ds:schemaRef ds:uri="http://purl.org/dc/dcmitype/"/>
-    <ds:schemaRef ds:uri="http://schemas.microsoft.com/office/infopath/2007/PartnerControls"/>
+    <ds:schemaRef ds:uri="http://schemas.microsoft.com/sharepoint/v3/contenttype/forms"/>
   </ds:schemaRefs>
 </ds:datastoreItem>
 </file>
@@ -8775,9 +8763,16 @@
 </file>
 
 <file path=customXml/itemProps3.xml><?xml version="1.0" encoding="utf-8"?>
-<ds:datastoreItem xmlns:ds="http://schemas.openxmlformats.org/officeDocument/2006/customXml" ds:itemID="{19E20559-B232-4371-8690-E3D8007EDB82}">
+<ds:datastoreItem xmlns:ds="http://schemas.openxmlformats.org/officeDocument/2006/customXml" ds:itemID="{A50EC660-24D0-43A0-AE5E-E274115E726B}">
   <ds:schemaRefs>
-    <ds:schemaRef ds:uri="http://schemas.microsoft.com/sharepoint/v3/contenttype/forms"/>
+    <ds:schemaRef ds:uri="http://www.w3.org/XML/1998/namespace"/>
+    <ds:schemaRef ds:uri="http://schemas.microsoft.com/office/2006/documentManagement/types"/>
+    <ds:schemaRef ds:uri="http://purl.org/dc/elements/1.1/"/>
+    <ds:schemaRef ds:uri="http://purl.org/dc/terms/"/>
+    <ds:schemaRef ds:uri="http://schemas.openxmlformats.org/package/2006/metadata/core-properties"/>
+    <ds:schemaRef ds:uri="http://schemas.microsoft.com/office/2006/metadata/properties"/>
+    <ds:schemaRef ds:uri="http://purl.org/dc/dcmitype/"/>
+    <ds:schemaRef ds:uri="http://schemas.microsoft.com/office/infopath/2007/PartnerControls"/>
   </ds:schemaRefs>
 </ds:datastoreItem>
 </file>
</xml_diff>